<commit_message>
finish describe function in pptx
</commit_message>
<xml_diff>
--- a/[MCU] AssignmentProject.pptx
+++ b/[MCU] AssignmentProject.pptx
@@ -159,15 +159,6 @@
 </p:presentation>
 </file>
 
-<file path=ppt/revisionInfo.xml><?xml version="1.0" encoding="utf-8"?>
-<p1510:revInfo xmlns:a="http://schemas.openxmlformats.org/drawingml/2006/main" xmlns:r="http://schemas.openxmlformats.org/officeDocument/2006/relationships" xmlns:p1510="http://schemas.microsoft.com/office/powerpoint/2015/10/main">
-  <p1510:revLst>
-    <p1510:client id="{6C127B72-A3F8-46AD-BC61-14EA2FFD87FD}" v="22" dt="2022-12-20T04:28:54.266"/>
-    <p1510:client id="{A4597862-DA1C-47A7-BDC1-13E7FD49096F}" v="2" dt="2022-12-19T17:43:45.348"/>
-  </p1510:revLst>
-</p1510:revInfo>
-</file>
-
 <file path=ppt/handoutMasters/handoutMaster1.xml><?xml version="1.0" encoding="utf-8"?>
 <p:handoutMaster xmlns:a="http://schemas.openxmlformats.org/drawingml/2006/main" xmlns:r="http://schemas.openxmlformats.org/officeDocument/2006/relationships" xmlns:p="http://schemas.openxmlformats.org/presentationml/2006/main">
   <p:cSld>
@@ -250,7 +241,7 @@
           <a:p>
             <a:fld id="{68796EA6-6F25-4F19-87BA-7ADCC16DAEFF}" type="datetimeFigureOut">
               <a:rPr lang="en-US" smtClean="0"/>
-              <a:t>20/12/2022</a:t>
+              <a:t>05/01/2023</a:t>
             </a:fld>
             <a:endParaRPr lang="en-US" dirty="0"/>
           </a:p>
@@ -415,7 +406,7 @@
           <a:p>
             <a:fld id="{C39C172E-A8B5-46F6-B05C-DFA3E2E0F207}" type="datetimeFigureOut">
               <a:rPr lang="en-US" smtClean="0"/>
-              <a:t>20/12/2022</a:t>
+              <a:t>05/01/2023</a:t>
             </a:fld>
             <a:endParaRPr lang="en-US" dirty="0"/>
           </a:p>
@@ -1467,7 +1458,7 @@
           <a:p>
             <a:fld id="{7B7FA170-8299-44AD-AEEF-FC686C3D7804}" type="datetime1">
               <a:rPr lang="en-US" smtClean="0"/>
-              <a:t>20/12/2022</a:t>
+              <a:t>05/01/2023</a:t>
             </a:fld>
             <a:endParaRPr lang="en-US" dirty="0"/>
           </a:p>
@@ -1648,7 +1639,7 @@
           <a:p>
             <a:fld id="{2231763A-68EC-4ECD-9620-D9FE9CDDD622}" type="datetime1">
               <a:rPr lang="en-US" smtClean="0"/>
-              <a:t>20/12/2022</a:t>
+              <a:t>05/01/2023</a:t>
             </a:fld>
             <a:endParaRPr lang="en-US" dirty="0"/>
           </a:p>
@@ -2128,7 +2119,7 @@
           <a:p>
             <a:fld id="{0AAE819F-B7FD-4B29-8F66-9E318144BC2A}" type="datetime1">
               <a:rPr lang="en-US" smtClean="0"/>
-              <a:t>20/12/2022</a:t>
+              <a:t>05/01/2023</a:t>
             </a:fld>
             <a:endParaRPr lang="en-US" dirty="0"/>
           </a:p>
@@ -2360,7 +2351,7 @@
           <a:p>
             <a:fld id="{D4CA159C-B6E0-4F10-9F4A-2FA57003B139}" type="datetime1">
               <a:rPr lang="en-US" smtClean="0"/>
-              <a:t>20/12/2022</a:t>
+              <a:t>05/01/2023</a:t>
             </a:fld>
             <a:endParaRPr lang="en-US" dirty="0"/>
           </a:p>
@@ -2651,7 +2642,7 @@
           <a:p>
             <a:fld id="{8170CBBB-D1D1-4386-A5E9-07F3477B78F3}" type="datetime1">
               <a:rPr lang="en-US" smtClean="0"/>
-              <a:t>20/12/2022</a:t>
+              <a:t>05/01/2023</a:t>
             </a:fld>
             <a:endParaRPr lang="en-US" dirty="0"/>
           </a:p>
@@ -3078,7 +3069,7 @@
           <a:p>
             <a:fld id="{9FA4CAD8-0EA7-4615-B69B-B2F199EF3A93}" type="datetime1">
               <a:rPr lang="en-US" smtClean="0"/>
-              <a:t>20/12/2022</a:t>
+              <a:t>05/01/2023</a:t>
             </a:fld>
             <a:endParaRPr lang="en-US" dirty="0"/>
           </a:p>
@@ -3230,7 +3221,7 @@
           <a:p>
             <a:fld id="{B9234BD7-6953-492C-921B-E68B2D7F14C8}" type="datetime1">
               <a:rPr lang="en-US" smtClean="0"/>
-              <a:t>20/12/2022</a:t>
+              <a:t>05/01/2023</a:t>
             </a:fld>
             <a:endParaRPr lang="en-US" dirty="0"/>
           </a:p>
@@ -3337,7 +3328,7 @@
           <a:p>
             <a:fld id="{35A17D9B-D4D3-4E23-88DF-2E354FA43196}" type="datetime1">
               <a:rPr lang="en-US" smtClean="0"/>
-              <a:t>20/12/2022</a:t>
+              <a:t>05/01/2023</a:t>
             </a:fld>
             <a:endParaRPr lang="en-US" dirty="0"/>
           </a:p>
@@ -3598,7 +3589,7 @@
           <a:p>
             <a:fld id="{541F67C5-D04E-4576-B61C-12ABA14BBD6C}" type="datetime1">
               <a:rPr lang="en-US" smtClean="0"/>
-              <a:t>20/12/2022</a:t>
+              <a:t>05/01/2023</a:t>
             </a:fld>
             <a:endParaRPr lang="en-US" dirty="0"/>
           </a:p>
@@ -4497,7 +4488,7 @@
           <a:p>
             <a:fld id="{C20F09E4-6EA4-4BF3-9FC8-FF40373B88E6}" type="datetime1">
               <a:rPr lang="en-US" smtClean="0"/>
-              <a:t>20/12/2022</a:t>
+              <a:t>05/01/2023</a:t>
             </a:fld>
             <a:endParaRPr lang="en-US" dirty="0"/>
           </a:p>
@@ -5964,28 +5955,27 @@
           <a:lstStyle/>
           <a:p>
             <a:r>
-              <a:rPr lang="en-US"/>
+              <a:rPr lang="en-US" dirty="0"/>
               <a:t>Clock: 64MHz</a:t>
             </a:r>
           </a:p>
           <a:p>
             <a:r>
-              <a:rPr lang="en-US"/>
+              <a:rPr lang="en-US" dirty="0"/>
               <a:t>TIM2: PSC = 7999, ARR = 79 =&gt; 100Hz clock</a:t>
             </a:r>
           </a:p>
           <a:p>
             <a:r>
-              <a:rPr lang="en-US"/>
+              <a:rPr lang="en-US" dirty="0"/>
               <a:t>TIM3 - PWM: PSC = 63, ARR = 999 =&gt; 1kHz clock</a:t>
             </a:r>
           </a:p>
           <a:p>
             <a:r>
-              <a:rPr lang="en-US"/>
-              <a:t>USART2, baud rate: 9600</a:t>
-            </a:r>
-            <a:endParaRPr lang="en-US" dirty="0"/>
+              <a:rPr lang="en-US" dirty="0"/>
+              <a:t>USART2, baud rate: 115200</a:t>
+            </a:r>
           </a:p>
         </p:txBody>
       </p:sp>
@@ -6265,36 +6255,60 @@
           <a:lstStyle/>
           <a:p>
             <a:r>
-              <a:rPr lang="vi-VN"/>
+              <a:rPr lang="vi-VN" dirty="0"/>
               <a:t>MANUAL MODE</a:t>
             </a:r>
           </a:p>
           <a:p>
-            <a:endParaRPr lang="vi-VN"/>
-          </a:p>
-          <a:p>
-            <a:r>
-              <a:rPr lang="vi-VN"/>
+            <a:endParaRPr lang="vi-VN" dirty="0"/>
+          </a:p>
+          <a:p>
+            <a:r>
+              <a:rPr lang="vi-VN" dirty="0"/>
               <a:t>Press ’’SELECT’’ =&gt; MANUAL MODE</a:t>
             </a:r>
-          </a:p>
-          <a:p>
-            <a:r>
-              <a:rPr lang="vi-VN"/>
+            <a:r>
+              <a:rPr lang="en-US" dirty="0"/>
+              <a:t> </a:t>
+            </a:r>
+          </a:p>
+          <a:p>
+            <a:pPr lvl="1"/>
+            <a:r>
+              <a:rPr lang="en-US" dirty="0"/>
+              <a:t>(Send “!MANUAL” UART) </a:t>
+            </a:r>
+            <a:endParaRPr lang="vi-VN" dirty="0"/>
+          </a:p>
+          <a:p>
+            <a:r>
+              <a:rPr lang="vi-VN" dirty="0"/>
               <a:t>=&gt; Force change traffic light (For policeman use)</a:t>
             </a:r>
-          </a:p>
-          <a:p>
-            <a:r>
-              <a:rPr lang="vi-VN"/>
+            <a:endParaRPr lang="en-US" dirty="0"/>
+          </a:p>
+          <a:p>
+            <a:pPr marL="109725" indent="0">
+              <a:buNone/>
+            </a:pPr>
+            <a:endParaRPr lang="vi-VN" dirty="0"/>
+          </a:p>
+          <a:p>
+            <a:r>
+              <a:rPr lang="vi-VN" dirty="0"/>
               <a:t>Press ’’MODIFY’’, change the traffic light manually</a:t>
             </a:r>
           </a:p>
           <a:p>
             <a:r>
-              <a:rPr lang="vi-VN"/>
+              <a:rPr lang="vi-VN" dirty="0"/>
               <a:t>Press ’’SET’’, return to AUTO MODE</a:t>
             </a:r>
+            <a:r>
+              <a:rPr lang="en-US" dirty="0"/>
+              <a:t> </a:t>
+            </a:r>
+            <a:endParaRPr lang="vi-VN" dirty="0"/>
           </a:p>
         </p:txBody>
       </p:sp>
@@ -6390,10 +6404,67 @@
           <a:lstStyle/>
           <a:p>
             <a:r>
+              <a:rPr lang="en-US" dirty="0"/>
+              <a:t>MODIFY TIME MODE</a:t>
+            </a:r>
+          </a:p>
+          <a:p>
+            <a:endParaRPr lang="en-US" dirty="0"/>
+          </a:p>
+          <a:p>
+            <a:r>
+              <a:rPr lang="en-US" dirty="0"/>
+              <a:t>Double press ”SELECT” =&gt; MODIFY MODE</a:t>
+            </a:r>
+          </a:p>
+          <a:p>
+            <a:endParaRPr lang="en-US" dirty="0"/>
+          </a:p>
+          <a:p>
+            <a:r>
+              <a:rPr lang="en-US" dirty="0"/>
+              <a:t>Press ”SELECT”  =&gt; Change LED color</a:t>
+            </a:r>
+          </a:p>
+          <a:p>
+            <a:r>
+              <a:rPr lang="en-US" dirty="0"/>
+              <a:t>Press ”MODIFY” =&gt; Increase value by 1</a:t>
+            </a:r>
+          </a:p>
+          <a:p>
+            <a:r>
+              <a:rPr lang="en-US" dirty="0"/>
+              <a:t>Double press ”MODIFY” =&gt; Increase by 10</a:t>
+            </a:r>
+          </a:p>
+          <a:p>
+            <a:r>
+              <a:rPr lang="en-US" dirty="0"/>
+              <a:t>Press ”SET” =&gt; Set value </a:t>
+            </a:r>
+          </a:p>
+          <a:p>
+            <a:pPr lvl="1"/>
+            <a:r>
+              <a:rPr lang="en-US" dirty="0"/>
+              <a:t>wait .. Sec, return Auto Mode</a:t>
+            </a:r>
+          </a:p>
+          <a:p>
+            <a:pPr lvl="1"/>
+            <a:r>
+              <a:rPr lang="en-US" dirty="0"/>
+              <a:t>Continue Modify </a:t>
+            </a:r>
+            <a:r>
               <a:rPr lang="en-US"/>
-              <a:t>MODIFY TIME MODE</a:t>
-            </a:r>
-            <a:endParaRPr lang="vi-VN"/>
+              <a:t>by press ”SELECT” </a:t>
+            </a:r>
+            <a:endParaRPr lang="en-US" dirty="0"/>
+          </a:p>
+          <a:p>
+            <a:endParaRPr lang="vi-VN" dirty="0"/>
           </a:p>
         </p:txBody>
       </p:sp>

</xml_diff>